<commit_message>
Update with code example
</commit_message>
<xml_diff>
--- a/fetchfeeds/Prez-FetchFeeds.pptx
+++ b/fetchfeeds/Prez-FetchFeeds.pptx
@@ -293,7 +293,7 @@
             <a:fld id="{98B80EF9-94CC-4E61-BD94-D5A58C3E90C2}" type="datetimeFigureOut">
               <a:rPr lang="fr-FR" smtClean="0"/>
               <a:pPr/>
-              <a:t>09/11/2009</a:t>
+              <a:t>10/11/2009</a:t>
             </a:fld>
             <a:endParaRPr lang="fr-FR"/>
           </a:p>
@@ -336,7 +336,7 @@
             <a:fld id="{97853E6A-2550-4D47-B0F5-4897721998DF}" type="slidenum">
               <a:rPr lang="fr-FR" smtClean="0"/>
               <a:pPr/>
-              <a:t>‹#›</a:t>
+              <a:t>‹N°›</a:t>
             </a:fld>
             <a:endParaRPr lang="fr-FR"/>
           </a:p>
@@ -460,7 +460,7 @@
             <a:fld id="{98B80EF9-94CC-4E61-BD94-D5A58C3E90C2}" type="datetimeFigureOut">
               <a:rPr lang="fr-FR" smtClean="0"/>
               <a:pPr/>
-              <a:t>09/11/2009</a:t>
+              <a:t>10/11/2009</a:t>
             </a:fld>
             <a:endParaRPr lang="fr-FR"/>
           </a:p>
@@ -503,7 +503,7 @@
             <a:fld id="{97853E6A-2550-4D47-B0F5-4897721998DF}" type="slidenum">
               <a:rPr lang="fr-FR" smtClean="0"/>
               <a:pPr/>
-              <a:t>‹#›</a:t>
+              <a:t>‹N°›</a:t>
             </a:fld>
             <a:endParaRPr lang="fr-FR"/>
           </a:p>
@@ -637,7 +637,7 @@
             <a:fld id="{98B80EF9-94CC-4E61-BD94-D5A58C3E90C2}" type="datetimeFigureOut">
               <a:rPr lang="fr-FR" smtClean="0"/>
               <a:pPr/>
-              <a:t>09/11/2009</a:t>
+              <a:t>10/11/2009</a:t>
             </a:fld>
             <a:endParaRPr lang="fr-FR"/>
           </a:p>
@@ -680,7 +680,7 @@
             <a:fld id="{97853E6A-2550-4D47-B0F5-4897721998DF}" type="slidenum">
               <a:rPr lang="fr-FR" smtClean="0"/>
               <a:pPr/>
-              <a:t>‹#›</a:t>
+              <a:t>‹N°›</a:t>
             </a:fld>
             <a:endParaRPr lang="fr-FR"/>
           </a:p>
@@ -804,7 +804,7 @@
             <a:fld id="{98B80EF9-94CC-4E61-BD94-D5A58C3E90C2}" type="datetimeFigureOut">
               <a:rPr lang="fr-FR" smtClean="0"/>
               <a:pPr/>
-              <a:t>09/11/2009</a:t>
+              <a:t>10/11/2009</a:t>
             </a:fld>
             <a:endParaRPr lang="fr-FR"/>
           </a:p>
@@ -847,7 +847,7 @@
             <a:fld id="{97853E6A-2550-4D47-B0F5-4897721998DF}" type="slidenum">
               <a:rPr lang="fr-FR" smtClean="0"/>
               <a:pPr/>
-              <a:t>‹#›</a:t>
+              <a:t>‹N°›</a:t>
             </a:fld>
             <a:endParaRPr lang="fr-FR"/>
           </a:p>
@@ -1047,7 +1047,7 @@
             <a:fld id="{98B80EF9-94CC-4E61-BD94-D5A58C3E90C2}" type="datetimeFigureOut">
               <a:rPr lang="fr-FR" smtClean="0"/>
               <a:pPr/>
-              <a:t>09/11/2009</a:t>
+              <a:t>10/11/2009</a:t>
             </a:fld>
             <a:endParaRPr lang="fr-FR"/>
           </a:p>
@@ -1090,7 +1090,7 @@
             <a:fld id="{97853E6A-2550-4D47-B0F5-4897721998DF}" type="slidenum">
               <a:rPr lang="fr-FR" smtClean="0"/>
               <a:pPr/>
-              <a:t>‹#›</a:t>
+              <a:t>‹N°›</a:t>
             </a:fld>
             <a:endParaRPr lang="fr-FR"/>
           </a:p>
@@ -1332,7 +1332,7 @@
             <a:fld id="{98B80EF9-94CC-4E61-BD94-D5A58C3E90C2}" type="datetimeFigureOut">
               <a:rPr lang="fr-FR" smtClean="0"/>
               <a:pPr/>
-              <a:t>09/11/2009</a:t>
+              <a:t>10/11/2009</a:t>
             </a:fld>
             <a:endParaRPr lang="fr-FR"/>
           </a:p>
@@ -1375,7 +1375,7 @@
             <a:fld id="{97853E6A-2550-4D47-B0F5-4897721998DF}" type="slidenum">
               <a:rPr lang="fr-FR" smtClean="0"/>
               <a:pPr/>
-              <a:t>‹#›</a:t>
+              <a:t>‹N°›</a:t>
             </a:fld>
             <a:endParaRPr lang="fr-FR"/>
           </a:p>
@@ -1751,7 +1751,7 @@
             <a:fld id="{98B80EF9-94CC-4E61-BD94-D5A58C3E90C2}" type="datetimeFigureOut">
               <a:rPr lang="fr-FR" smtClean="0"/>
               <a:pPr/>
-              <a:t>09/11/2009</a:t>
+              <a:t>10/11/2009</a:t>
             </a:fld>
             <a:endParaRPr lang="fr-FR"/>
           </a:p>
@@ -1794,7 +1794,7 @@
             <a:fld id="{97853E6A-2550-4D47-B0F5-4897721998DF}" type="slidenum">
               <a:rPr lang="fr-FR" smtClean="0"/>
               <a:pPr/>
-              <a:t>‹#›</a:t>
+              <a:t>‹N°›</a:t>
             </a:fld>
             <a:endParaRPr lang="fr-FR"/>
           </a:p>
@@ -1866,7 +1866,7 @@
             <a:fld id="{98B80EF9-94CC-4E61-BD94-D5A58C3E90C2}" type="datetimeFigureOut">
               <a:rPr lang="fr-FR" smtClean="0"/>
               <a:pPr/>
-              <a:t>09/11/2009</a:t>
+              <a:t>10/11/2009</a:t>
             </a:fld>
             <a:endParaRPr lang="fr-FR"/>
           </a:p>
@@ -1909,7 +1909,7 @@
             <a:fld id="{97853E6A-2550-4D47-B0F5-4897721998DF}" type="slidenum">
               <a:rPr lang="fr-FR" smtClean="0"/>
               <a:pPr/>
-              <a:t>‹#›</a:t>
+              <a:t>‹N°›</a:t>
             </a:fld>
             <a:endParaRPr lang="fr-FR"/>
           </a:p>
@@ -1958,7 +1958,7 @@
             <a:fld id="{98B80EF9-94CC-4E61-BD94-D5A58C3E90C2}" type="datetimeFigureOut">
               <a:rPr lang="fr-FR" smtClean="0"/>
               <a:pPr/>
-              <a:t>09/11/2009</a:t>
+              <a:t>10/11/2009</a:t>
             </a:fld>
             <a:endParaRPr lang="fr-FR"/>
           </a:p>
@@ -2001,7 +2001,7 @@
             <a:fld id="{97853E6A-2550-4D47-B0F5-4897721998DF}" type="slidenum">
               <a:rPr lang="fr-FR" smtClean="0"/>
               <a:pPr/>
-              <a:t>‹#›</a:t>
+              <a:t>‹N°›</a:t>
             </a:fld>
             <a:endParaRPr lang="fr-FR"/>
           </a:p>
@@ -2232,7 +2232,7 @@
             <a:fld id="{98B80EF9-94CC-4E61-BD94-D5A58C3E90C2}" type="datetimeFigureOut">
               <a:rPr lang="fr-FR" smtClean="0"/>
               <a:pPr/>
-              <a:t>09/11/2009</a:t>
+              <a:t>10/11/2009</a:t>
             </a:fld>
             <a:endParaRPr lang="fr-FR"/>
           </a:p>
@@ -2275,7 +2275,7 @@
             <a:fld id="{97853E6A-2550-4D47-B0F5-4897721998DF}" type="slidenum">
               <a:rPr lang="fr-FR" smtClean="0"/>
               <a:pPr/>
-              <a:t>‹#›</a:t>
+              <a:t>‹N°›</a:t>
             </a:fld>
             <a:endParaRPr lang="fr-FR"/>
           </a:p>
@@ -2482,7 +2482,7 @@
             <a:fld id="{98B80EF9-94CC-4E61-BD94-D5A58C3E90C2}" type="datetimeFigureOut">
               <a:rPr lang="fr-FR" smtClean="0"/>
               <a:pPr/>
-              <a:t>09/11/2009</a:t>
+              <a:t>10/11/2009</a:t>
             </a:fld>
             <a:endParaRPr lang="fr-FR"/>
           </a:p>
@@ -2525,7 +2525,7 @@
             <a:fld id="{97853E6A-2550-4D47-B0F5-4897721998DF}" type="slidenum">
               <a:rPr lang="fr-FR" smtClean="0"/>
               <a:pPr/>
-              <a:t>‹#›</a:t>
+              <a:t>‹N°›</a:t>
             </a:fld>
             <a:endParaRPr lang="fr-FR"/>
           </a:p>
@@ -2692,7 +2692,7 @@
             <a:fld id="{98B80EF9-94CC-4E61-BD94-D5A58C3E90C2}" type="datetimeFigureOut">
               <a:rPr lang="fr-FR" smtClean="0"/>
               <a:pPr/>
-              <a:t>09/11/2009</a:t>
+              <a:t>10/11/2009</a:t>
             </a:fld>
             <a:endParaRPr lang="fr-FR"/>
           </a:p>
@@ -2771,7 +2771,7 @@
             <a:fld id="{97853E6A-2550-4D47-B0F5-4897721998DF}" type="slidenum">
               <a:rPr lang="fr-FR" smtClean="0"/>
               <a:pPr/>
-              <a:t>‹#›</a:t>
+              <a:t>‹N°›</a:t>
             </a:fld>
             <a:endParaRPr lang="fr-FR"/>
           </a:p>
@@ -4654,6 +4654,13 @@
   <p:clrMapOvr>
     <a:masterClrMapping/>
   </p:clrMapOvr>
+  <p:timing>
+    <p:tnLst>
+      <p:par>
+        <p:cTn id="1" dur="indefinite" restart="never" nodeType="tmRoot"/>
+      </p:par>
+    </p:tnLst>
+  </p:timing>
 </p:sld>
 </file>
 
@@ -4674,6 +4681,32 @@
           <a:chExt cx="0" cy="0"/>
         </a:xfrm>
       </p:grpSpPr>
+      <p:pic>
+        <p:nvPicPr>
+          <p:cNvPr id="8" name="Picture 3" descr="C:\Users\mag\Pictures\pictos\pictogrammes\pastilleIntegrationContinue.png"/>
+          <p:cNvPicPr>
+            <a:picLocks noChangeAspect="1" noChangeArrowheads="1"/>
+          </p:cNvPicPr>
+          <p:nvPr/>
+        </p:nvPicPr>
+        <p:blipFill>
+          <a:blip r:embed="rId2" cstate="print"/>
+          <a:srcRect/>
+          <a:stretch>
+            <a:fillRect/>
+          </a:stretch>
+        </p:blipFill>
+        <p:spPr bwMode="auto">
+          <a:xfrm>
+            <a:off x="428596" y="4773618"/>
+            <a:ext cx="2084382" cy="2084382"/>
+          </a:xfrm>
+          <a:prstGeom prst="rect">
+            <a:avLst/>
+          </a:prstGeom>
+          <a:noFill/>
+        </p:spPr>
+      </p:pic>
       <p:sp>
         <p:nvSpPr>
           <p:cNvPr id="5" name="Rectangle 4"/>
@@ -4967,16 +5000,112 @@
           </a:p>
         </p:txBody>
       </p:sp>
-      <p:sp>
-        <p:nvSpPr>
-          <p:cNvPr id="20" name="ZoneTexte 19"/>
+      <p:pic>
+        <p:nvPicPr>
+          <p:cNvPr id="1027" name="Picture 3"/>
+          <p:cNvPicPr>
+            <a:picLocks noChangeAspect="1" noChangeArrowheads="1"/>
+          </p:cNvPicPr>
+          <p:nvPr/>
+        </p:nvPicPr>
+        <p:blipFill>
+          <a:blip r:embed="rId3" cstate="print"/>
+          <a:srcRect/>
+          <a:stretch>
+            <a:fillRect/>
+          </a:stretch>
+        </p:blipFill>
+        <p:spPr bwMode="auto">
+          <a:xfrm>
+            <a:off x="2714612" y="571480"/>
+            <a:ext cx="6215106" cy="2423427"/>
+          </a:xfrm>
+          <a:prstGeom prst="rect">
+            <a:avLst/>
+          </a:prstGeom>
+          <a:noFill/>
+          <a:ln w="9525">
+            <a:noFill/>
+            <a:miter lim="800000"/>
+            <a:headEnd/>
+            <a:tailEnd/>
+          </a:ln>
+        </p:spPr>
+      </p:pic>
+      <p:pic>
+        <p:nvPicPr>
+          <p:cNvPr id="1028" name="Picture 4"/>
+          <p:cNvPicPr>
+            <a:picLocks noChangeAspect="1" noChangeArrowheads="1"/>
+          </p:cNvPicPr>
+          <p:nvPr/>
+        </p:nvPicPr>
+        <p:blipFill>
+          <a:blip r:embed="rId4" cstate="print"/>
+          <a:srcRect/>
+          <a:stretch>
+            <a:fillRect/>
+          </a:stretch>
+        </p:blipFill>
+        <p:spPr bwMode="auto">
+          <a:xfrm>
+            <a:off x="2714612" y="3429000"/>
+            <a:ext cx="6286546" cy="571504"/>
+          </a:xfrm>
+          <a:prstGeom prst="rect">
+            <a:avLst/>
+          </a:prstGeom>
+          <a:noFill/>
+          <a:ln w="9525">
+            <a:noFill/>
+            <a:miter lim="800000"/>
+            <a:headEnd/>
+            <a:tailEnd/>
+          </a:ln>
+        </p:spPr>
+      </p:pic>
+      <p:pic>
+        <p:nvPicPr>
+          <p:cNvPr id="1029" name="Picture 5"/>
+          <p:cNvPicPr>
+            <a:picLocks noChangeAspect="1" noChangeArrowheads="1"/>
+          </p:cNvPicPr>
+          <p:nvPr/>
+        </p:nvPicPr>
+        <p:blipFill>
+          <a:blip r:embed="rId5" cstate="print"/>
+          <a:srcRect/>
+          <a:stretch>
+            <a:fillRect/>
+          </a:stretch>
+        </p:blipFill>
+        <p:spPr bwMode="auto">
+          <a:xfrm>
+            <a:off x="2786050" y="4500570"/>
+            <a:ext cx="3857652" cy="715326"/>
+          </a:xfrm>
+          <a:prstGeom prst="rect">
+            <a:avLst/>
+          </a:prstGeom>
+          <a:noFill/>
+          <a:ln w="9525">
+            <a:noFill/>
+            <a:miter lim="800000"/>
+            <a:headEnd/>
+            <a:tailEnd/>
+          </a:ln>
+        </p:spPr>
+      </p:pic>
+      <p:sp>
+        <p:nvSpPr>
+          <p:cNvPr id="12" name="ZoneTexte 11"/>
           <p:cNvSpPr txBox="1"/>
           <p:nvPr/>
         </p:nvSpPr>
         <p:spPr>
           <a:xfrm>
-            <a:off x="3000364" y="571480"/>
-            <a:ext cx="5500726" cy="4801314"/>
+            <a:off x="2643174" y="214290"/>
+            <a:ext cx="6357982" cy="5909310"/>
           </a:xfrm>
           <a:prstGeom prst="rect">
             <a:avLst/>
@@ -4996,15 +5125,15 @@
           </a:bodyPr>
           <a:lstStyle/>
           <a:p>
-            <a:r>
-              <a:rPr lang="fr-FR" dirty="0" smtClean="0"/>
-              <a:t>Code :</a:t>
-            </a:r>
+            <a:endParaRPr lang="fr-FR" dirty="0"/>
           </a:p>
           <a:p>
             <a:endParaRPr lang="fr-FR" dirty="0" smtClean="0"/>
           </a:p>
           <a:p>
+            <a:endParaRPr lang="fr-FR" dirty="0"/>
+          </a:p>
+          <a:p>
             <a:endParaRPr lang="fr-FR" dirty="0" smtClean="0"/>
           </a:p>
           <a:p>
@@ -5047,41 +5176,31 @@
             <a:endParaRPr lang="fr-FR" dirty="0" smtClean="0"/>
           </a:p>
           <a:p>
+            <a:endParaRPr lang="fr-FR" dirty="0" smtClean="0"/>
+          </a:p>
+          <a:p>
+            <a:endParaRPr lang="fr-FR" dirty="0" smtClean="0"/>
+          </a:p>
+          <a:p>
+            <a:endParaRPr lang="fr-FR" dirty="0" smtClean="0"/>
+          </a:p>
+          <a:p>
             <a:endParaRPr lang="fr-FR" dirty="0"/>
           </a:p>
         </p:txBody>
       </p:sp>
-      <p:pic>
-        <p:nvPicPr>
-          <p:cNvPr id="8" name="Picture 3" descr="C:\Users\mag\Pictures\pictos\pictogrammes\pastilleIntegrationContinue.png"/>
-          <p:cNvPicPr>
-            <a:picLocks noChangeAspect="1" noChangeArrowheads="1"/>
-          </p:cNvPicPr>
-          <p:nvPr/>
-        </p:nvPicPr>
-        <p:blipFill>
-          <a:blip r:embed="rId2" cstate="print"/>
-          <a:srcRect/>
-          <a:stretch>
-            <a:fillRect/>
-          </a:stretch>
-        </p:blipFill>
-        <p:spPr bwMode="auto">
-          <a:xfrm>
-            <a:off x="571472" y="4773618"/>
-            <a:ext cx="2084382" cy="2084382"/>
-          </a:xfrm>
-          <a:prstGeom prst="rect">
-            <a:avLst/>
-          </a:prstGeom>
-          <a:noFill/>
-        </p:spPr>
-      </p:pic>
     </p:spTree>
   </p:cSld>
   <p:clrMapOvr>
     <a:masterClrMapping/>
   </p:clrMapOvr>
+  <p:timing>
+    <p:tnLst>
+      <p:par>
+        <p:cTn id="1" dur="indefinite" restart="never" nodeType="tmRoot"/>
+      </p:par>
+    </p:tnLst>
+  </p:timing>
 </p:sld>
 </file>
 
@@ -5119,7 +5238,7 @@
         </p:blipFill>
         <p:spPr bwMode="auto">
           <a:xfrm>
-            <a:off x="500034" y="3929066"/>
+            <a:off x="357190" y="3857628"/>
             <a:ext cx="1428772" cy="1428772"/>
           </a:xfrm>
           <a:prstGeom prst="rect">
@@ -5136,7 +5255,7 @@
         </p:nvSpPr>
         <p:spPr>
           <a:xfrm rot="5400000" flipH="1" flipV="1">
-            <a:off x="141297" y="358745"/>
+            <a:off x="141297" y="430183"/>
             <a:ext cx="931852" cy="1214446"/>
           </a:xfrm>
           <a:prstGeom prst="circularArrow">
@@ -5180,7 +5299,7 @@
         </p:nvSpPr>
         <p:spPr>
           <a:xfrm>
-            <a:off x="1643042" y="2643182"/>
+            <a:off x="1500198" y="2571744"/>
             <a:ext cx="2500330" cy="500066"/>
           </a:xfrm>
           <a:prstGeom prst="ellipse">
@@ -5246,7 +5365,7 @@
         </p:nvSpPr>
         <p:spPr>
           <a:xfrm>
-            <a:off x="1000100" y="1357298"/>
+            <a:off x="857256" y="1285860"/>
             <a:ext cx="484632" cy="2428892"/>
           </a:xfrm>
           <a:prstGeom prst="downArrow">
@@ -5286,7 +5405,7 @@
         </p:nvSpPr>
         <p:spPr>
           <a:xfrm rot="16200000" flipV="1">
-            <a:off x="1357290" y="3571876"/>
+            <a:off x="1214446" y="3500438"/>
             <a:ext cx="1357322" cy="642942"/>
           </a:xfrm>
           <a:prstGeom prst="bentArrow">
@@ -5330,7 +5449,7 @@
         </p:nvSpPr>
         <p:spPr>
           <a:xfrm>
-            <a:off x="2428860" y="3214686"/>
+            <a:off x="2286016" y="3143248"/>
             <a:ext cx="484632" cy="2143140"/>
           </a:xfrm>
           <a:prstGeom prst="downArrow">
@@ -5370,7 +5489,7 @@
         </p:nvSpPr>
         <p:spPr>
           <a:xfrm>
-            <a:off x="1785918" y="4643446"/>
+            <a:off x="1643074" y="4572008"/>
             <a:ext cx="1214446" cy="357190"/>
           </a:xfrm>
           <a:prstGeom prst="roundRect">
@@ -5441,7 +5560,7 @@
         </p:nvSpPr>
         <p:spPr>
           <a:xfrm>
-            <a:off x="2285984" y="1142984"/>
+            <a:off x="2143140" y="1071546"/>
             <a:ext cx="1428760" cy="857256"/>
           </a:xfrm>
           <a:prstGeom prst="rect">
@@ -5656,8 +5775,8 @@
         </p:nvSpPr>
         <p:spPr>
           <a:xfrm>
-            <a:off x="4214810" y="214290"/>
-            <a:ext cx="4786346" cy="6429420"/>
+            <a:off x="4000496" y="214290"/>
+            <a:ext cx="5000660" cy="5909310"/>
           </a:xfrm>
           <a:prstGeom prst="rect">
             <a:avLst/>
@@ -5676,12 +5795,6 @@
             <a:spAutoFit/>
           </a:bodyPr>
           <a:lstStyle/>
-          <a:p>
-            <a:r>
-              <a:rPr lang="fr-FR" dirty="0" smtClean="0"/>
-              <a:t>Code :</a:t>
-            </a:r>
-          </a:p>
           <a:p>
             <a:endParaRPr lang="fr-FR" dirty="0"/>
           </a:p>
@@ -5764,7 +5877,7 @@
         </p:blipFill>
         <p:spPr bwMode="auto">
           <a:xfrm>
-            <a:off x="714348" y="571480"/>
+            <a:off x="571504" y="500042"/>
             <a:ext cx="1144358" cy="1140714"/>
           </a:xfrm>
           <a:prstGeom prst="rect">
@@ -5790,7 +5903,7 @@
         </p:blipFill>
         <p:spPr bwMode="auto">
           <a:xfrm>
-            <a:off x="2143108" y="5357826"/>
+            <a:off x="2000264" y="5286388"/>
             <a:ext cx="928694" cy="1036369"/>
           </a:xfrm>
           <a:prstGeom prst="rect">
@@ -5822,7 +5935,7 @@
         </p:blipFill>
         <p:spPr bwMode="auto">
           <a:xfrm>
-            <a:off x="2000232" y="1714488"/>
+            <a:off x="1857388" y="1643050"/>
             <a:ext cx="525279" cy="357190"/>
           </a:xfrm>
           <a:prstGeom prst="rect">
@@ -5848,7 +5961,7 @@
         </p:blipFill>
         <p:spPr bwMode="auto">
           <a:xfrm>
-            <a:off x="2071670" y="1000108"/>
+            <a:off x="1928826" y="928670"/>
             <a:ext cx="357190" cy="357190"/>
           </a:xfrm>
           <a:prstGeom prst="rect">
@@ -5874,7 +5987,7 @@
         </p:blipFill>
         <p:spPr bwMode="auto">
           <a:xfrm>
-            <a:off x="3214678" y="5214950"/>
+            <a:off x="3071802" y="5143512"/>
             <a:ext cx="1512878" cy="1512878"/>
           </a:xfrm>
           <a:prstGeom prst="rect">
@@ -5891,7 +6004,7 @@
         </p:nvSpPr>
         <p:spPr>
           <a:xfrm rot="10064775">
-            <a:off x="3510961" y="3193908"/>
+            <a:off x="3368117" y="3122470"/>
             <a:ext cx="384973" cy="2000179"/>
           </a:xfrm>
           <a:prstGeom prst="downArrow">
@@ -5931,7 +6044,7 @@
         </p:nvSpPr>
         <p:spPr>
           <a:xfrm>
-            <a:off x="3143240" y="4714884"/>
+            <a:off x="3000396" y="4643446"/>
             <a:ext cx="1043831" cy="266762"/>
           </a:xfrm>
           <a:prstGeom prst="roundRect">
@@ -6002,7 +6115,7 @@
         </p:nvSpPr>
         <p:spPr>
           <a:xfrm>
-            <a:off x="3071802" y="5000636"/>
+            <a:off x="2928958" y="4929198"/>
             <a:ext cx="1115270" cy="266762"/>
           </a:xfrm>
           <a:prstGeom prst="roundRect">
@@ -6073,7 +6186,7 @@
         </p:nvSpPr>
         <p:spPr>
           <a:xfrm>
-            <a:off x="2786050" y="2000240"/>
+            <a:off x="2643206" y="1928802"/>
             <a:ext cx="270318" cy="642942"/>
           </a:xfrm>
           <a:prstGeom prst="downArrow">
@@ -6105,11 +6218,82 @@
           </a:p>
         </p:txBody>
       </p:sp>
+      <p:pic>
+        <p:nvPicPr>
+          <p:cNvPr id="2050" name="Picture 2"/>
+          <p:cNvPicPr>
+            <a:picLocks noChangeAspect="1" noChangeArrowheads="1"/>
+          </p:cNvPicPr>
+          <p:nvPr/>
+        </p:nvPicPr>
+        <p:blipFill>
+          <a:blip r:embed="rId8" cstate="print"/>
+          <a:srcRect/>
+          <a:stretch>
+            <a:fillRect/>
+          </a:stretch>
+        </p:blipFill>
+        <p:spPr bwMode="auto">
+          <a:xfrm>
+            <a:off x="4071934" y="714356"/>
+            <a:ext cx="4857785" cy="1603189"/>
+          </a:xfrm>
+          <a:prstGeom prst="rect">
+            <a:avLst/>
+          </a:prstGeom>
+          <a:noFill/>
+          <a:ln w="9525">
+            <a:noFill/>
+            <a:miter lim="800000"/>
+            <a:headEnd/>
+            <a:tailEnd/>
+          </a:ln>
+        </p:spPr>
+      </p:pic>
+      <p:pic>
+        <p:nvPicPr>
+          <p:cNvPr id="2053" name="Picture 5"/>
+          <p:cNvPicPr>
+            <a:picLocks noChangeAspect="1" noChangeArrowheads="1"/>
+          </p:cNvPicPr>
+          <p:nvPr/>
+        </p:nvPicPr>
+        <p:blipFill>
+          <a:blip r:embed="rId9" cstate="print"/>
+          <a:srcRect/>
+          <a:stretch>
+            <a:fillRect/>
+          </a:stretch>
+        </p:blipFill>
+        <p:spPr bwMode="auto">
+          <a:xfrm>
+            <a:off x="4071934" y="2928934"/>
+            <a:ext cx="4866067" cy="2143140"/>
+          </a:xfrm>
+          <a:prstGeom prst="rect">
+            <a:avLst/>
+          </a:prstGeom>
+          <a:noFill/>
+          <a:ln w="9525">
+            <a:noFill/>
+            <a:miter lim="800000"/>
+            <a:headEnd/>
+            <a:tailEnd/>
+          </a:ln>
+        </p:spPr>
+      </p:pic>
     </p:spTree>
   </p:cSld>
   <p:clrMapOvr>
     <a:masterClrMapping/>
   </p:clrMapOvr>
+  <p:timing>
+    <p:tnLst>
+      <p:par>
+        <p:cTn id="1" dur="indefinite" restart="never" nodeType="tmRoot"/>
+      </p:par>
+    </p:tnLst>
+  </p:timing>
 </p:sld>
 </file>
 
@@ -6147,7 +6331,7 @@
         </p:blipFill>
         <p:spPr bwMode="auto">
           <a:xfrm>
-            <a:off x="357158" y="3786190"/>
+            <a:off x="0" y="3714752"/>
             <a:ext cx="1428772" cy="1428772"/>
           </a:xfrm>
           <a:prstGeom prst="rect">
@@ -6158,32 +6342,62 @@
       </p:pic>
       <p:sp>
         <p:nvSpPr>
-          <p:cNvPr id="6" name="Ellipse 5"/>
+          <p:cNvPr id="7" name="Virage 6"/>
           <p:cNvSpPr/>
           <p:nvPr/>
         </p:nvSpPr>
         <p:spPr>
-          <a:xfrm>
-            <a:off x="1643042" y="2643182"/>
-            <a:ext cx="2500330" cy="500066"/>
-          </a:xfrm>
-          <a:prstGeom prst="ellipse">
+          <a:xfrm rot="16200000" flipV="1">
+            <a:off x="1000132" y="3214686"/>
+            <a:ext cx="1357322" cy="928694"/>
+          </a:xfrm>
+          <a:prstGeom prst="bentArrow">
             <a:avLst/>
           </a:prstGeom>
-          <a:gradFill>
-            <a:gsLst>
-              <a:gs pos="0">
-                <a:srgbClr val="FFEFD1"/>
-              </a:gs>
-              <a:gs pos="64999">
-                <a:srgbClr val="F0EBD5"/>
-              </a:gs>
-              <a:gs pos="100000">
-                <a:srgbClr val="D1C39F"/>
-              </a:gs>
-            </a:gsLst>
-            <a:lin ang="5400000" scaled="0"/>
-          </a:gradFill>
+        </p:spPr>
+        <p:style>
+          <a:lnRef idx="2">
+            <a:schemeClr val="accent3">
+              <a:shade val="50000"/>
+            </a:schemeClr>
+          </a:lnRef>
+          <a:fillRef idx="1">
+            <a:schemeClr val="accent3"/>
+          </a:fillRef>
+          <a:effectRef idx="0">
+            <a:schemeClr val="accent3"/>
+          </a:effectRef>
+          <a:fontRef idx="minor">
+            <a:schemeClr val="lt1"/>
+          </a:fontRef>
+        </p:style>
+        <p:txBody>
+          <a:bodyPr rtlCol="0" anchor="ctr"/>
+          <a:lstStyle/>
+          <a:p>
+            <a:pPr algn="ctr"/>
+            <a:endParaRPr lang="fr-FR">
+              <a:solidFill>
+                <a:schemeClr val="tx1"/>
+              </a:solidFill>
+            </a:endParaRPr>
+          </a:p>
+        </p:txBody>
+      </p:sp>
+      <p:sp>
+        <p:nvSpPr>
+          <p:cNvPr id="8" name="Flèche vers le bas 7"/>
+          <p:cNvSpPr/>
+          <p:nvPr/>
+        </p:nvSpPr>
+        <p:spPr>
+          <a:xfrm rot="10800000">
+            <a:off x="2643206" y="3000372"/>
+            <a:ext cx="484632" cy="2286016"/>
+          </a:xfrm>
+          <a:prstGeom prst="downArrow">
+            <a:avLst/>
+          </a:prstGeom>
         </p:spPr>
         <p:style>
           <a:lnRef idx="2">
@@ -6206,80 +6420,29 @@
           <a:lstStyle/>
           <a:p>
             <a:pPr algn="ctr"/>
-            <a:r>
-              <a:rPr lang="fr-FR" dirty="0" err="1" smtClean="0">
-                <a:solidFill>
-                  <a:schemeClr val="tx1"/>
-                </a:solidFill>
-              </a:rPr>
-              <a:t>Notify</a:t>
-            </a:r>
-            <a:endParaRPr lang="fr-FR" dirty="0">
-              <a:solidFill>
-                <a:schemeClr val="tx1"/>
-              </a:solidFill>
-            </a:endParaRPr>
-          </a:p>
-        </p:txBody>
-      </p:sp>
-      <p:sp>
-        <p:nvSpPr>
-          <p:cNvPr id="7" name="Virage 6"/>
+            <a:endParaRPr lang="fr-FR"/>
+          </a:p>
+        </p:txBody>
+      </p:sp>
+      <p:sp>
+        <p:nvSpPr>
+          <p:cNvPr id="9" name="Rectangle à coins arrondis 8"/>
           <p:cNvSpPr/>
           <p:nvPr/>
         </p:nvSpPr>
         <p:spPr>
-          <a:xfrm rot="16200000" flipV="1">
-            <a:off x="1357290" y="3286124"/>
-            <a:ext cx="1357322" cy="928694"/>
-          </a:xfrm>
-          <a:prstGeom prst="bentArrow">
+          <a:xfrm>
+            <a:off x="2143140" y="4143380"/>
+            <a:ext cx="1500198" cy="428628"/>
+          </a:xfrm>
+          <a:prstGeom prst="roundRect">
             <a:avLst/>
           </a:prstGeom>
-        </p:spPr>
-        <p:style>
-          <a:lnRef idx="2">
-            <a:schemeClr val="accent3">
-              <a:shade val="50000"/>
+          <a:solidFill>
+            <a:schemeClr val="bg1">
+              <a:lumMod val="85000"/>
             </a:schemeClr>
-          </a:lnRef>
-          <a:fillRef idx="1">
-            <a:schemeClr val="accent3"/>
-          </a:fillRef>
-          <a:effectRef idx="0">
-            <a:schemeClr val="accent3"/>
-          </a:effectRef>
-          <a:fontRef idx="minor">
-            <a:schemeClr val="lt1"/>
-          </a:fontRef>
-        </p:style>
-        <p:txBody>
-          <a:bodyPr rtlCol="0" anchor="ctr"/>
-          <a:lstStyle/>
-          <a:p>
-            <a:pPr algn="ctr"/>
-            <a:endParaRPr lang="fr-FR">
-              <a:solidFill>
-                <a:schemeClr val="tx1"/>
-              </a:solidFill>
-            </a:endParaRPr>
-          </a:p>
-        </p:txBody>
-      </p:sp>
-      <p:sp>
-        <p:nvSpPr>
-          <p:cNvPr id="8" name="Flèche vers le bas 7"/>
-          <p:cNvSpPr/>
-          <p:nvPr/>
-        </p:nvSpPr>
-        <p:spPr>
-          <a:xfrm rot="10800000">
-            <a:off x="3000364" y="3071810"/>
-            <a:ext cx="484632" cy="2286016"/>
-          </a:xfrm>
-          <a:prstGeom prst="downArrow">
-            <a:avLst/>
-          </a:prstGeom>
+          </a:solidFill>
         </p:spPr>
         <p:style>
           <a:lnRef idx="2">
@@ -6302,51 +6465,6 @@
           <a:lstStyle/>
           <a:p>
             <a:pPr algn="ctr"/>
-            <a:endParaRPr lang="fr-FR"/>
-          </a:p>
-        </p:txBody>
-      </p:sp>
-      <p:sp>
-        <p:nvSpPr>
-          <p:cNvPr id="9" name="Rectangle à coins arrondis 8"/>
-          <p:cNvSpPr/>
-          <p:nvPr/>
-        </p:nvSpPr>
-        <p:spPr>
-          <a:xfrm>
-            <a:off x="2500298" y="4214818"/>
-            <a:ext cx="1500198" cy="428628"/>
-          </a:xfrm>
-          <a:prstGeom prst="roundRect">
-            <a:avLst/>
-          </a:prstGeom>
-          <a:solidFill>
-            <a:schemeClr val="bg1">
-              <a:lumMod val="85000"/>
-            </a:schemeClr>
-          </a:solidFill>
-        </p:spPr>
-        <p:style>
-          <a:lnRef idx="2">
-            <a:schemeClr val="accent1">
-              <a:shade val="50000"/>
-            </a:schemeClr>
-          </a:lnRef>
-          <a:fillRef idx="1">
-            <a:schemeClr val="accent1"/>
-          </a:fillRef>
-          <a:effectRef idx="0">
-            <a:schemeClr val="accent1"/>
-          </a:effectRef>
-          <a:fontRef idx="minor">
-            <a:schemeClr val="lt1"/>
-          </a:fontRef>
-        </p:style>
-        <p:txBody>
-          <a:bodyPr rtlCol="0" anchor="ctr"/>
-          <a:lstStyle/>
-          <a:p>
-            <a:pPr algn="ctr"/>
             <a:r>
               <a:rPr lang="fr-FR" dirty="0" err="1" smtClean="0">
                 <a:solidFill>
@@ -6385,7 +6503,7 @@
         </p:nvSpPr>
         <p:spPr>
           <a:xfrm>
-            <a:off x="2285984" y="1142984"/>
+            <a:off x="1928826" y="1071546"/>
             <a:ext cx="1428760" cy="857256"/>
           </a:xfrm>
           <a:prstGeom prst="rect">
@@ -6577,8 +6695,8 @@
         </p:nvSpPr>
         <p:spPr>
           <a:xfrm>
-            <a:off x="4214810" y="214290"/>
-            <a:ext cx="4786346" cy="6429420"/>
+            <a:off x="4000496" y="214290"/>
+            <a:ext cx="5000660" cy="6429420"/>
           </a:xfrm>
           <a:prstGeom prst="rect">
             <a:avLst/>
@@ -6598,10 +6716,7 @@
           </a:bodyPr>
           <a:lstStyle/>
           <a:p>
-            <a:r>
-              <a:rPr lang="fr-FR" dirty="0" smtClean="0"/>
-              <a:t>Code :</a:t>
-            </a:r>
+            <a:endParaRPr lang="fr-FR" dirty="0" smtClean="0"/>
           </a:p>
           <a:p>
             <a:endParaRPr lang="fr-FR" dirty="0"/>
@@ -6676,7 +6791,7 @@
         </p:nvSpPr>
         <p:spPr>
           <a:xfrm rot="10800000">
-            <a:off x="2714612" y="2000240"/>
+            <a:off x="2357454" y="1928802"/>
             <a:ext cx="484632" cy="642943"/>
           </a:xfrm>
           <a:prstGeom prst="downArrow">
@@ -6725,7 +6840,7 @@
         </p:blipFill>
         <p:spPr bwMode="auto">
           <a:xfrm>
-            <a:off x="3428992" y="1000108"/>
+            <a:off x="3071834" y="928670"/>
             <a:ext cx="486229" cy="500042"/>
           </a:xfrm>
           <a:prstGeom prst="rect">
@@ -6751,7 +6866,7 @@
         </p:blipFill>
         <p:spPr bwMode="auto">
           <a:xfrm>
-            <a:off x="2143108" y="928670"/>
+            <a:off x="1785950" y="857232"/>
             <a:ext cx="461970" cy="461970"/>
           </a:xfrm>
           <a:prstGeom prst="rect">
@@ -6777,7 +6892,7 @@
         </p:blipFill>
         <p:spPr bwMode="auto">
           <a:xfrm>
-            <a:off x="2786050" y="5429264"/>
+            <a:off x="2428892" y="5357826"/>
             <a:ext cx="928694" cy="1036369"/>
           </a:xfrm>
           <a:prstGeom prst="rect">
@@ -6792,11 +6907,148 @@
           </a:ln>
         </p:spPr>
       </p:pic>
+      <p:pic>
+        <p:nvPicPr>
+          <p:cNvPr id="3075" name="Picture 3"/>
+          <p:cNvPicPr>
+            <a:picLocks noChangeAspect="1" noChangeArrowheads="1"/>
+          </p:cNvPicPr>
+          <p:nvPr/>
+        </p:nvPicPr>
+        <p:blipFill>
+          <a:blip r:embed="rId6" cstate="print"/>
+          <a:srcRect/>
+          <a:stretch>
+            <a:fillRect/>
+          </a:stretch>
+        </p:blipFill>
+        <p:spPr bwMode="auto">
+          <a:xfrm>
+            <a:off x="4143372" y="357166"/>
+            <a:ext cx="4734104" cy="1714513"/>
+          </a:xfrm>
+          <a:prstGeom prst="rect">
+            <a:avLst/>
+          </a:prstGeom>
+          <a:noFill/>
+          <a:ln w="9525">
+            <a:noFill/>
+            <a:miter lim="800000"/>
+            <a:headEnd/>
+            <a:tailEnd/>
+          </a:ln>
+        </p:spPr>
+      </p:pic>
+      <p:pic>
+        <p:nvPicPr>
+          <p:cNvPr id="3076" name="Picture 4"/>
+          <p:cNvPicPr>
+            <a:picLocks noChangeAspect="1" noChangeArrowheads="1"/>
+          </p:cNvPicPr>
+          <p:nvPr/>
+        </p:nvPicPr>
+        <p:blipFill>
+          <a:blip r:embed="rId7" cstate="print"/>
+          <a:srcRect/>
+          <a:stretch>
+            <a:fillRect/>
+          </a:stretch>
+        </p:blipFill>
+        <p:spPr bwMode="auto">
+          <a:xfrm>
+            <a:off x="4071934" y="3929066"/>
+            <a:ext cx="4881797" cy="1357322"/>
+          </a:xfrm>
+          <a:prstGeom prst="rect">
+            <a:avLst/>
+          </a:prstGeom>
+          <a:noFill/>
+          <a:ln w="9525">
+            <a:noFill/>
+            <a:miter lim="800000"/>
+            <a:headEnd/>
+            <a:tailEnd/>
+          </a:ln>
+        </p:spPr>
+      </p:pic>
+      <p:sp>
+        <p:nvSpPr>
+          <p:cNvPr id="6" name="Ellipse 5"/>
+          <p:cNvSpPr/>
+          <p:nvPr/>
+        </p:nvSpPr>
+        <p:spPr>
+          <a:xfrm>
+            <a:off x="1643042" y="2643182"/>
+            <a:ext cx="2500330" cy="500066"/>
+          </a:xfrm>
+          <a:prstGeom prst="ellipse">
+            <a:avLst/>
+          </a:prstGeom>
+          <a:gradFill>
+            <a:gsLst>
+              <a:gs pos="0">
+                <a:srgbClr val="FFEFD1"/>
+              </a:gs>
+              <a:gs pos="64999">
+                <a:srgbClr val="F0EBD5"/>
+              </a:gs>
+              <a:gs pos="100000">
+                <a:srgbClr val="D1C39F"/>
+              </a:gs>
+            </a:gsLst>
+            <a:lin ang="5400000" scaled="0"/>
+          </a:gradFill>
+        </p:spPr>
+        <p:style>
+          <a:lnRef idx="2">
+            <a:schemeClr val="accent1">
+              <a:shade val="50000"/>
+            </a:schemeClr>
+          </a:lnRef>
+          <a:fillRef idx="1">
+            <a:schemeClr val="accent1"/>
+          </a:fillRef>
+          <a:effectRef idx="0">
+            <a:schemeClr val="accent1"/>
+          </a:effectRef>
+          <a:fontRef idx="minor">
+            <a:schemeClr val="lt1"/>
+          </a:fontRef>
+        </p:style>
+        <p:txBody>
+          <a:bodyPr rtlCol="0" anchor="ctr"/>
+          <a:lstStyle/>
+          <a:p>
+            <a:pPr algn="ctr"/>
+            <a:r>
+              <a:rPr lang="fr-FR" dirty="0" err="1" smtClean="0">
+                <a:solidFill>
+                  <a:schemeClr val="tx1"/>
+                </a:solidFill>
+              </a:rPr>
+              <a:t>Notify</a:t>
+            </a:r>
+            <a:endParaRPr lang="fr-FR" dirty="0">
+              <a:solidFill>
+                <a:schemeClr val="tx1"/>
+              </a:solidFill>
+            </a:endParaRPr>
+          </a:p>
+        </p:txBody>
+      </p:sp>
     </p:spTree>
   </p:cSld>
   <p:clrMapOvr>
     <a:masterClrMapping/>
   </p:clrMapOvr>
+  <p:timing>
+    <p:tnLst>
+      <p:par>
+        <p:cTn id="1" dur="indefinite" restart="never" nodeType="tmRoot"/>
+      </p:par>
+    </p:tnLst>
+  </p:timing>
 </p:sld>
 </file>
 
@@ -7064,6 +7316,13 @@
   <p:clrMapOvr>
     <a:masterClrMapping/>
   </p:clrMapOvr>
+  <p:timing>
+    <p:tnLst>
+      <p:par>
+        <p:cTn id="1" dur="indefinite" restart="never" nodeType="tmRoot"/>
+      </p:par>
+    </p:tnLst>
+  </p:timing>
 </p:sld>
 </file>
 

</xml_diff>

<commit_message>
Update the presentation slides with gaelyk 0.3.2
</commit_message>
<xml_diff>
--- a/fetchfeeds/Prez-FetchFeeds.pptx
+++ b/fetchfeeds/Prez-FetchFeeds.pptx
@@ -293,7 +293,7 @@
             <a:fld id="{98B80EF9-94CC-4E61-BD94-D5A58C3E90C2}" type="datetimeFigureOut">
               <a:rPr lang="fr-FR" smtClean="0"/>
               <a:pPr/>
-              <a:t>10/11/2009</a:t>
+              <a:t>17/12/2009</a:t>
             </a:fld>
             <a:endParaRPr lang="fr-FR"/>
           </a:p>
@@ -460,7 +460,7 @@
             <a:fld id="{98B80EF9-94CC-4E61-BD94-D5A58C3E90C2}" type="datetimeFigureOut">
               <a:rPr lang="fr-FR" smtClean="0"/>
               <a:pPr/>
-              <a:t>10/11/2009</a:t>
+              <a:t>17/12/2009</a:t>
             </a:fld>
             <a:endParaRPr lang="fr-FR"/>
           </a:p>
@@ -637,7 +637,7 @@
             <a:fld id="{98B80EF9-94CC-4E61-BD94-D5A58C3E90C2}" type="datetimeFigureOut">
               <a:rPr lang="fr-FR" smtClean="0"/>
               <a:pPr/>
-              <a:t>10/11/2009</a:t>
+              <a:t>17/12/2009</a:t>
             </a:fld>
             <a:endParaRPr lang="fr-FR"/>
           </a:p>
@@ -804,7 +804,7 @@
             <a:fld id="{98B80EF9-94CC-4E61-BD94-D5A58C3E90C2}" type="datetimeFigureOut">
               <a:rPr lang="fr-FR" smtClean="0"/>
               <a:pPr/>
-              <a:t>10/11/2009</a:t>
+              <a:t>17/12/2009</a:t>
             </a:fld>
             <a:endParaRPr lang="fr-FR"/>
           </a:p>
@@ -1047,7 +1047,7 @@
             <a:fld id="{98B80EF9-94CC-4E61-BD94-D5A58C3E90C2}" type="datetimeFigureOut">
               <a:rPr lang="fr-FR" smtClean="0"/>
               <a:pPr/>
-              <a:t>10/11/2009</a:t>
+              <a:t>17/12/2009</a:t>
             </a:fld>
             <a:endParaRPr lang="fr-FR"/>
           </a:p>
@@ -1332,7 +1332,7 @@
             <a:fld id="{98B80EF9-94CC-4E61-BD94-D5A58C3E90C2}" type="datetimeFigureOut">
               <a:rPr lang="fr-FR" smtClean="0"/>
               <a:pPr/>
-              <a:t>10/11/2009</a:t>
+              <a:t>17/12/2009</a:t>
             </a:fld>
             <a:endParaRPr lang="fr-FR"/>
           </a:p>
@@ -1751,7 +1751,7 @@
             <a:fld id="{98B80EF9-94CC-4E61-BD94-D5A58C3E90C2}" type="datetimeFigureOut">
               <a:rPr lang="fr-FR" smtClean="0"/>
               <a:pPr/>
-              <a:t>10/11/2009</a:t>
+              <a:t>17/12/2009</a:t>
             </a:fld>
             <a:endParaRPr lang="fr-FR"/>
           </a:p>
@@ -1866,7 +1866,7 @@
             <a:fld id="{98B80EF9-94CC-4E61-BD94-D5A58C3E90C2}" type="datetimeFigureOut">
               <a:rPr lang="fr-FR" smtClean="0"/>
               <a:pPr/>
-              <a:t>10/11/2009</a:t>
+              <a:t>17/12/2009</a:t>
             </a:fld>
             <a:endParaRPr lang="fr-FR"/>
           </a:p>
@@ -1958,7 +1958,7 @@
             <a:fld id="{98B80EF9-94CC-4E61-BD94-D5A58C3E90C2}" type="datetimeFigureOut">
               <a:rPr lang="fr-FR" smtClean="0"/>
               <a:pPr/>
-              <a:t>10/11/2009</a:t>
+              <a:t>17/12/2009</a:t>
             </a:fld>
             <a:endParaRPr lang="fr-FR"/>
           </a:p>
@@ -2232,7 +2232,7 @@
             <a:fld id="{98B80EF9-94CC-4E61-BD94-D5A58C3E90C2}" type="datetimeFigureOut">
               <a:rPr lang="fr-FR" smtClean="0"/>
               <a:pPr/>
-              <a:t>10/11/2009</a:t>
+              <a:t>17/12/2009</a:t>
             </a:fld>
             <a:endParaRPr lang="fr-FR"/>
           </a:p>
@@ -2482,7 +2482,7 @@
             <a:fld id="{98B80EF9-94CC-4E61-BD94-D5A58C3E90C2}" type="datetimeFigureOut">
               <a:rPr lang="fr-FR" smtClean="0"/>
               <a:pPr/>
-              <a:t>10/11/2009</a:t>
+              <a:t>17/12/2009</a:t>
             </a:fld>
             <a:endParaRPr lang="fr-FR"/>
           </a:p>
@@ -2692,7 +2692,7 @@
             <a:fld id="{98B80EF9-94CC-4E61-BD94-D5A58C3E90C2}" type="datetimeFigureOut">
               <a:rPr lang="fr-FR" smtClean="0"/>
               <a:pPr/>
-              <a:t>10/11/2009</a:t>
+              <a:t>17/12/2009</a:t>
             </a:fld>
             <a:endParaRPr lang="fr-FR"/>
           </a:p>
@@ -5002,7 +5002,7 @@
       </p:sp>
       <p:pic>
         <p:nvPicPr>
-          <p:cNvPr id="1027" name="Picture 3"/>
+          <p:cNvPr id="1029" name="Picture 5"/>
           <p:cNvPicPr>
             <a:picLocks noChangeAspect="1" noChangeArrowheads="1"/>
           </p:cNvPicPr>
@@ -5017,8 +5017,8 @@
         </p:blipFill>
         <p:spPr bwMode="auto">
           <a:xfrm>
-            <a:off x="2714612" y="571480"/>
-            <a:ext cx="6215106" cy="2423427"/>
+            <a:off x="2786050" y="4786322"/>
+            <a:ext cx="3857652" cy="715326"/>
           </a:xfrm>
           <a:prstGeom prst="rect">
             <a:avLst/>
@@ -5032,9 +5032,102 @@
           </a:ln>
         </p:spPr>
       </p:pic>
+      <p:sp>
+        <p:nvSpPr>
+          <p:cNvPr id="12" name="ZoneTexte 11"/>
+          <p:cNvSpPr txBox="1"/>
+          <p:nvPr/>
+        </p:nvSpPr>
+        <p:spPr>
+          <a:xfrm>
+            <a:off x="2643174" y="214290"/>
+            <a:ext cx="6357982" cy="5909310"/>
+          </a:xfrm>
+          <a:prstGeom prst="rect">
+            <a:avLst/>
+          </a:prstGeom>
+          <a:noFill/>
+          <a:ln>
+            <a:solidFill>
+              <a:schemeClr val="accent1">
+                <a:shade val="50000"/>
+              </a:schemeClr>
+            </a:solidFill>
+          </a:ln>
+        </p:spPr>
+        <p:txBody>
+          <a:bodyPr wrap="square" rtlCol="0">
+            <a:spAutoFit/>
+          </a:bodyPr>
+          <a:lstStyle/>
+          <a:p>
+            <a:endParaRPr lang="fr-FR" dirty="0"/>
+          </a:p>
+          <a:p>
+            <a:endParaRPr lang="fr-FR" dirty="0" smtClean="0"/>
+          </a:p>
+          <a:p>
+            <a:endParaRPr lang="fr-FR" dirty="0"/>
+          </a:p>
+          <a:p>
+            <a:endParaRPr lang="fr-FR" dirty="0" smtClean="0"/>
+          </a:p>
+          <a:p>
+            <a:endParaRPr lang="fr-FR" dirty="0" smtClean="0"/>
+          </a:p>
+          <a:p>
+            <a:endParaRPr lang="fr-FR" dirty="0" smtClean="0"/>
+          </a:p>
+          <a:p>
+            <a:endParaRPr lang="fr-FR" dirty="0" smtClean="0"/>
+          </a:p>
+          <a:p>
+            <a:endParaRPr lang="fr-FR" dirty="0" smtClean="0"/>
+          </a:p>
+          <a:p>
+            <a:endParaRPr lang="fr-FR" dirty="0" smtClean="0"/>
+          </a:p>
+          <a:p>
+            <a:endParaRPr lang="fr-FR" dirty="0" smtClean="0"/>
+          </a:p>
+          <a:p>
+            <a:endParaRPr lang="fr-FR" dirty="0" smtClean="0"/>
+          </a:p>
+          <a:p>
+            <a:endParaRPr lang="fr-FR" dirty="0" smtClean="0"/>
+          </a:p>
+          <a:p>
+            <a:endParaRPr lang="fr-FR" dirty="0" smtClean="0"/>
+          </a:p>
+          <a:p>
+            <a:endParaRPr lang="fr-FR" dirty="0" smtClean="0"/>
+          </a:p>
+          <a:p>
+            <a:endParaRPr lang="fr-FR" dirty="0" smtClean="0"/>
+          </a:p>
+          <a:p>
+            <a:endParaRPr lang="fr-FR" dirty="0" smtClean="0"/>
+          </a:p>
+          <a:p>
+            <a:endParaRPr lang="fr-FR" dirty="0" smtClean="0"/>
+          </a:p>
+          <a:p>
+            <a:endParaRPr lang="fr-FR" dirty="0" smtClean="0"/>
+          </a:p>
+          <a:p>
+            <a:endParaRPr lang="fr-FR" dirty="0" smtClean="0"/>
+          </a:p>
+          <a:p>
+            <a:endParaRPr lang="fr-FR" dirty="0" smtClean="0"/>
+          </a:p>
+          <a:p>
+            <a:endParaRPr lang="fr-FR" dirty="0"/>
+          </a:p>
+        </p:txBody>
+      </p:sp>
       <p:pic>
         <p:nvPicPr>
-          <p:cNvPr id="1028" name="Picture 4"/>
+          <p:cNvPr id="1026" name="Picture 2"/>
           <p:cNvPicPr>
             <a:picLocks noChangeAspect="1" noChangeArrowheads="1"/>
           </p:cNvPicPr>
@@ -5049,8 +5142,8 @@
         </p:blipFill>
         <p:spPr bwMode="auto">
           <a:xfrm>
-            <a:off x="2714612" y="3429000"/>
-            <a:ext cx="6286546" cy="571504"/>
+            <a:off x="2714612" y="428604"/>
+            <a:ext cx="6215106" cy="2473027"/>
           </a:xfrm>
           <a:prstGeom prst="rect">
             <a:avLst/>
@@ -5066,7 +5159,7 @@
       </p:pic>
       <p:pic>
         <p:nvPicPr>
-          <p:cNvPr id="1029" name="Picture 5"/>
+          <p:cNvPr id="3" name="Picture 4"/>
           <p:cNvPicPr>
             <a:picLocks noChangeAspect="1" noChangeArrowheads="1"/>
           </p:cNvPicPr>
@@ -5081,8 +5174,8 @@
         </p:blipFill>
         <p:spPr bwMode="auto">
           <a:xfrm>
-            <a:off x="2786050" y="4500570"/>
-            <a:ext cx="3857652" cy="715326"/>
+            <a:off x="2714612" y="3429000"/>
+            <a:ext cx="6229394" cy="759682"/>
           </a:xfrm>
           <a:prstGeom prst="rect">
             <a:avLst/>
@@ -5096,99 +5189,6 @@
           </a:ln>
         </p:spPr>
       </p:pic>
-      <p:sp>
-        <p:nvSpPr>
-          <p:cNvPr id="12" name="ZoneTexte 11"/>
-          <p:cNvSpPr txBox="1"/>
-          <p:nvPr/>
-        </p:nvSpPr>
-        <p:spPr>
-          <a:xfrm>
-            <a:off x="2643174" y="214290"/>
-            <a:ext cx="6357982" cy="5909310"/>
-          </a:xfrm>
-          <a:prstGeom prst="rect">
-            <a:avLst/>
-          </a:prstGeom>
-          <a:noFill/>
-          <a:ln>
-            <a:solidFill>
-              <a:schemeClr val="accent1">
-                <a:shade val="50000"/>
-              </a:schemeClr>
-            </a:solidFill>
-          </a:ln>
-        </p:spPr>
-        <p:txBody>
-          <a:bodyPr wrap="square" rtlCol="0">
-            <a:spAutoFit/>
-          </a:bodyPr>
-          <a:lstStyle/>
-          <a:p>
-            <a:endParaRPr lang="fr-FR" dirty="0"/>
-          </a:p>
-          <a:p>
-            <a:endParaRPr lang="fr-FR" dirty="0" smtClean="0"/>
-          </a:p>
-          <a:p>
-            <a:endParaRPr lang="fr-FR" dirty="0"/>
-          </a:p>
-          <a:p>
-            <a:endParaRPr lang="fr-FR" dirty="0" smtClean="0"/>
-          </a:p>
-          <a:p>
-            <a:endParaRPr lang="fr-FR" dirty="0" smtClean="0"/>
-          </a:p>
-          <a:p>
-            <a:endParaRPr lang="fr-FR" dirty="0" smtClean="0"/>
-          </a:p>
-          <a:p>
-            <a:endParaRPr lang="fr-FR" dirty="0" smtClean="0"/>
-          </a:p>
-          <a:p>
-            <a:endParaRPr lang="fr-FR" dirty="0" smtClean="0"/>
-          </a:p>
-          <a:p>
-            <a:endParaRPr lang="fr-FR" dirty="0" smtClean="0"/>
-          </a:p>
-          <a:p>
-            <a:endParaRPr lang="fr-FR" dirty="0" smtClean="0"/>
-          </a:p>
-          <a:p>
-            <a:endParaRPr lang="fr-FR" dirty="0" smtClean="0"/>
-          </a:p>
-          <a:p>
-            <a:endParaRPr lang="fr-FR" dirty="0" smtClean="0"/>
-          </a:p>
-          <a:p>
-            <a:endParaRPr lang="fr-FR" dirty="0" smtClean="0"/>
-          </a:p>
-          <a:p>
-            <a:endParaRPr lang="fr-FR" dirty="0" smtClean="0"/>
-          </a:p>
-          <a:p>
-            <a:endParaRPr lang="fr-FR" dirty="0" smtClean="0"/>
-          </a:p>
-          <a:p>
-            <a:endParaRPr lang="fr-FR" dirty="0" smtClean="0"/>
-          </a:p>
-          <a:p>
-            <a:endParaRPr lang="fr-FR" dirty="0" smtClean="0"/>
-          </a:p>
-          <a:p>
-            <a:endParaRPr lang="fr-FR" dirty="0" smtClean="0"/>
-          </a:p>
-          <a:p>
-            <a:endParaRPr lang="fr-FR" dirty="0" smtClean="0"/>
-          </a:p>
-          <a:p>
-            <a:endParaRPr lang="fr-FR" dirty="0" smtClean="0"/>
-          </a:p>
-          <a:p>
-            <a:endParaRPr lang="fr-FR" dirty="0"/>
-          </a:p>
-        </p:txBody>
-      </p:sp>
     </p:spTree>
   </p:cSld>
   <p:clrMapOvr>
@@ -6252,7 +6252,7 @@
       </p:pic>
       <p:pic>
         <p:nvPicPr>
-          <p:cNvPr id="2053" name="Picture 5"/>
+          <p:cNvPr id="2051" name="Picture 3"/>
           <p:cNvPicPr>
             <a:picLocks noChangeAspect="1" noChangeArrowheads="1"/>
           </p:cNvPicPr>
@@ -6267,8 +6267,8 @@
         </p:blipFill>
         <p:spPr bwMode="auto">
           <a:xfrm>
-            <a:off x="4071934" y="2928934"/>
-            <a:ext cx="4866067" cy="2143140"/>
+            <a:off x="4071935" y="3026348"/>
+            <a:ext cx="4857784" cy="1545659"/>
           </a:xfrm>
           <a:prstGeom prst="rect">
             <a:avLst/>
@@ -6392,7 +6392,7 @@
         </p:nvSpPr>
         <p:spPr>
           <a:xfrm rot="10800000">
-            <a:off x="2643206" y="3000372"/>
+            <a:off x="2571736" y="3214686"/>
             <a:ext cx="484632" cy="2286016"/>
           </a:xfrm>
           <a:prstGeom prst="downArrow">
@@ -6432,7 +6432,7 @@
         </p:nvSpPr>
         <p:spPr>
           <a:xfrm>
-            <a:off x="2143140" y="4143380"/>
+            <a:off x="2071670" y="4286256"/>
             <a:ext cx="1500198" cy="428628"/>
           </a:xfrm>
           <a:prstGeom prst="roundRect">
@@ -6791,7 +6791,7 @@
         </p:nvSpPr>
         <p:spPr>
           <a:xfrm rot="10800000">
-            <a:off x="2357454" y="1928802"/>
+            <a:off x="2428860" y="2000240"/>
             <a:ext cx="484632" cy="642943"/>
           </a:xfrm>
           <a:prstGeom prst="downArrow">
@@ -6892,7 +6892,7 @@
         </p:blipFill>
         <p:spPr bwMode="auto">
           <a:xfrm>
-            <a:off x="2428892" y="5357826"/>
+            <a:off x="2357422" y="5572140"/>
             <a:ext cx="928694" cy="1036369"/>
           </a:xfrm>
           <a:prstGeom prst="rect">
@@ -6907,70 +6907,6 @@
           </a:ln>
         </p:spPr>
       </p:pic>
-      <p:pic>
-        <p:nvPicPr>
-          <p:cNvPr id="3075" name="Picture 3"/>
-          <p:cNvPicPr>
-            <a:picLocks noChangeAspect="1" noChangeArrowheads="1"/>
-          </p:cNvPicPr>
-          <p:nvPr/>
-        </p:nvPicPr>
-        <p:blipFill>
-          <a:blip r:embed="rId6" cstate="print"/>
-          <a:srcRect/>
-          <a:stretch>
-            <a:fillRect/>
-          </a:stretch>
-        </p:blipFill>
-        <p:spPr bwMode="auto">
-          <a:xfrm>
-            <a:off x="4143372" y="357166"/>
-            <a:ext cx="4734104" cy="1714513"/>
-          </a:xfrm>
-          <a:prstGeom prst="rect">
-            <a:avLst/>
-          </a:prstGeom>
-          <a:noFill/>
-          <a:ln w="9525">
-            <a:noFill/>
-            <a:miter lim="800000"/>
-            <a:headEnd/>
-            <a:tailEnd/>
-          </a:ln>
-        </p:spPr>
-      </p:pic>
-      <p:pic>
-        <p:nvPicPr>
-          <p:cNvPr id="3076" name="Picture 4"/>
-          <p:cNvPicPr>
-            <a:picLocks noChangeAspect="1" noChangeArrowheads="1"/>
-          </p:cNvPicPr>
-          <p:nvPr/>
-        </p:nvPicPr>
-        <p:blipFill>
-          <a:blip r:embed="rId7" cstate="print"/>
-          <a:srcRect/>
-          <a:stretch>
-            <a:fillRect/>
-          </a:stretch>
-        </p:blipFill>
-        <p:spPr bwMode="auto">
-          <a:xfrm>
-            <a:off x="4071934" y="3929066"/>
-            <a:ext cx="4881797" cy="1357322"/>
-          </a:xfrm>
-          <a:prstGeom prst="rect">
-            <a:avLst/>
-          </a:prstGeom>
-          <a:noFill/>
-          <a:ln w="9525">
-            <a:noFill/>
-            <a:miter lim="800000"/>
-            <a:headEnd/>
-            <a:tailEnd/>
-          </a:ln>
-        </p:spPr>
-      </p:pic>
       <p:sp>
         <p:nvSpPr>
           <p:cNvPr id="6" name="Ellipse 5"/>
@@ -6979,7 +6915,7 @@
         </p:nvSpPr>
         <p:spPr>
           <a:xfrm>
-            <a:off x="1643042" y="2643182"/>
+            <a:off x="1428728" y="2643182"/>
             <a:ext cx="2500330" cy="500066"/>
           </a:xfrm>
           <a:prstGeom prst="ellipse">
@@ -7037,6 +6973,134 @@
           </a:p>
         </p:txBody>
       </p:sp>
+      <p:pic>
+        <p:nvPicPr>
+          <p:cNvPr id="2" name="Picture 3"/>
+          <p:cNvPicPr>
+            <a:picLocks noChangeAspect="1" noChangeArrowheads="1"/>
+          </p:cNvPicPr>
+          <p:nvPr/>
+        </p:nvPicPr>
+        <p:blipFill>
+          <a:blip r:embed="rId6" cstate="print"/>
+          <a:srcRect/>
+          <a:stretch>
+            <a:fillRect/>
+          </a:stretch>
+        </p:blipFill>
+        <p:spPr bwMode="auto">
+          <a:xfrm>
+            <a:off x="4071934" y="357166"/>
+            <a:ext cx="4714908" cy="792897"/>
+          </a:xfrm>
+          <a:prstGeom prst="rect">
+            <a:avLst/>
+          </a:prstGeom>
+          <a:noFill/>
+          <a:ln w="9525">
+            <a:noFill/>
+            <a:miter lim="800000"/>
+            <a:headEnd/>
+            <a:tailEnd/>
+          </a:ln>
+        </p:spPr>
+      </p:pic>
+      <p:pic>
+        <p:nvPicPr>
+          <p:cNvPr id="3078" name="Picture 6"/>
+          <p:cNvPicPr>
+            <a:picLocks noChangeAspect="1" noChangeArrowheads="1"/>
+          </p:cNvPicPr>
+          <p:nvPr/>
+        </p:nvPicPr>
+        <p:blipFill>
+          <a:blip r:embed="rId7" cstate="print"/>
+          <a:srcRect/>
+          <a:stretch>
+            <a:fillRect/>
+          </a:stretch>
+        </p:blipFill>
+        <p:spPr bwMode="auto">
+          <a:xfrm>
+            <a:off x="4071934" y="1500174"/>
+            <a:ext cx="4929222" cy="1687070"/>
+          </a:xfrm>
+          <a:prstGeom prst="rect">
+            <a:avLst/>
+          </a:prstGeom>
+          <a:noFill/>
+          <a:ln w="9525">
+            <a:noFill/>
+            <a:miter lim="800000"/>
+            <a:headEnd/>
+            <a:tailEnd/>
+          </a:ln>
+        </p:spPr>
+      </p:pic>
+      <p:pic>
+        <p:nvPicPr>
+          <p:cNvPr id="3079" name="Picture 7"/>
+          <p:cNvPicPr>
+            <a:picLocks noChangeAspect="1" noChangeArrowheads="1"/>
+          </p:cNvPicPr>
+          <p:nvPr/>
+        </p:nvPicPr>
+        <p:blipFill>
+          <a:blip r:embed="rId8" cstate="print"/>
+          <a:srcRect/>
+          <a:stretch>
+            <a:fillRect/>
+          </a:stretch>
+        </p:blipFill>
+        <p:spPr bwMode="auto">
+          <a:xfrm>
+            <a:off x="4071934" y="3571876"/>
+            <a:ext cx="4857784" cy="1173377"/>
+          </a:xfrm>
+          <a:prstGeom prst="rect">
+            <a:avLst/>
+          </a:prstGeom>
+          <a:noFill/>
+          <a:ln w="9525">
+            <a:noFill/>
+            <a:miter lim="800000"/>
+            <a:headEnd/>
+            <a:tailEnd/>
+          </a:ln>
+        </p:spPr>
+      </p:pic>
+      <p:pic>
+        <p:nvPicPr>
+          <p:cNvPr id="3080" name="Picture 8"/>
+          <p:cNvPicPr>
+            <a:picLocks noChangeAspect="1" noChangeArrowheads="1"/>
+          </p:cNvPicPr>
+          <p:nvPr/>
+        </p:nvPicPr>
+        <p:blipFill>
+          <a:blip r:embed="rId9" cstate="print"/>
+          <a:srcRect/>
+          <a:stretch>
+            <a:fillRect/>
+          </a:stretch>
+        </p:blipFill>
+        <p:spPr bwMode="auto">
+          <a:xfrm>
+            <a:off x="4071934" y="5143512"/>
+            <a:ext cx="4929222" cy="1397839"/>
+          </a:xfrm>
+          <a:prstGeom prst="rect">
+            <a:avLst/>
+          </a:prstGeom>
+          <a:noFill/>
+          <a:ln w="9525">
+            <a:noFill/>
+            <a:miter lim="800000"/>
+            <a:headEnd/>
+            <a:tailEnd/>
+          </a:ln>
+        </p:spPr>
+      </p:pic>
     </p:spTree>
   </p:cSld>
   <p:clrMapOvr>

</xml_diff>